<commit_message>
Adds knowledge sharing to presentation
</commit_message>
<xml_diff>
--- a/presentation/Janus.pptx
+++ b/presentation/Janus.pptx
@@ -3898,8 +3898,8 @@
         </p:nvSpPr>
         <p:spPr>
           <a:xfrm>
-            <a:off x="594110" y="2121763"/>
-            <a:ext cx="3764826" cy="3773010"/>
+            <a:off x="594109" y="2121763"/>
+            <a:ext cx="4075081" cy="3773010"/>
           </a:xfrm>
         </p:spPr>
         <p:txBody>
@@ -4143,6 +4143,16 @@
                 </a:solidFill>
               </a:rPr>
               <a:t>Many people access same account</a:t>
+            </a:r>
+          </a:p>
+          <a:p>
+            <a:r>
+              <a:rPr lang="en-US" sz="3200" dirty="0">
+                <a:solidFill>
+                  <a:schemeClr val="bg1"/>
+                </a:solidFill>
+              </a:rPr>
+              <a:t>No knowledge sharing</a:t>
             </a:r>
           </a:p>
           <a:p>
@@ -4671,6 +4681,16 @@
                 </a:solidFill>
               </a:rPr>
               <a:t>Simplify account access</a:t>
+            </a:r>
+          </a:p>
+          <a:p>
+            <a:r>
+              <a:rPr lang="en-US" sz="3200" dirty="0">
+                <a:solidFill>
+                  <a:schemeClr val="bg1"/>
+                </a:solidFill>
+              </a:rPr>
+              <a:t>Manage contacts</a:t>
             </a:r>
           </a:p>
           <a:p>

</xml_diff>